<commit_message>
split prob-intro.pptx into prob-intro-tree-model prob-intro-sample-space
</commit_message>
<xml_diff>
--- a/spring12/slidesS12/prob-intro.pptx
+++ b/spring12/slidesS12/prob-intro.pptx
@@ -5,10 +5,10 @@
     <p:sldMasterId id="2147483650" r:id="rId1"/>
   </p:sldMasterIdLst>
   <p:notesMasterIdLst>
-    <p:notesMasterId r:id="rId34"/>
+    <p:notesMasterId r:id="rId33"/>
   </p:notesMasterIdLst>
   <p:handoutMasterIdLst>
-    <p:handoutMasterId r:id="rId35"/>
+    <p:handoutMasterId r:id="rId34"/>
   </p:handoutMasterIdLst>
   <p:sldIdLst>
     <p:sldId id="256" r:id="rId2"/>
@@ -42,12 +42,11 @@
     <p:sldId id="284" r:id="rId30"/>
     <p:sldId id="285" r:id="rId31"/>
     <p:sldId id="286" r:id="rId32"/>
-    <p:sldId id="287" r:id="rId33"/>
   </p:sldIdLst>
   <p:sldSz cx="9144000" cy="6858000" type="screen4x3"/>
   <p:notesSz cx="9601200" cy="7315200"/>
   <p:custDataLst>
-    <p:tags r:id="rId37"/>
+    <p:tags r:id="rId36"/>
   </p:custDataLst>
   <p:defaultTextStyle>
     <a:defPPr>
@@ -3794,123 +3793,6 @@
 </p:notes>
 </file>
 
-<file path=ppt/notesSlides/notesSlide32.xml><?xml version="1.0" encoding="utf-8"?>
-<p:notes xmlns:a="http://schemas.openxmlformats.org/drawingml/2006/main" xmlns:r="http://schemas.openxmlformats.org/officeDocument/2006/relationships" xmlns:p="http://schemas.openxmlformats.org/presentationml/2006/main">
-  <p:cSld>
-    <p:spTree>
-      <p:nvGrpSpPr>
-        <p:cNvPr id="1" name=""/>
-        <p:cNvGrpSpPr/>
-        <p:nvPr/>
-      </p:nvGrpSpPr>
-      <p:grpSpPr>
-        <a:xfrm>
-          <a:off x="0" y="0"/>
-          <a:ext cx="0" cy="0"/>
-          <a:chOff x="0" y="0"/>
-          <a:chExt cx="0" cy="0"/>
-        </a:xfrm>
-      </p:grpSpPr>
-      <p:sp>
-        <p:nvSpPr>
-          <p:cNvPr id="63490" name="Slide Image Placeholder 1"/>
-          <p:cNvSpPr>
-            <a:spLocks noGrp="1" noRot="1" noChangeAspect="1" noTextEdit="1"/>
-          </p:cNvSpPr>
-          <p:nvPr>
-            <p:ph type="sldImg"/>
-          </p:nvPr>
-        </p:nvSpPr>
-        <p:spPr>
-          <a:ln/>
-        </p:spPr>
-      </p:sp>
-      <p:sp>
-        <p:nvSpPr>
-          <p:cNvPr id="63491" name="Notes Placeholder 2"/>
-          <p:cNvSpPr>
-            <a:spLocks noGrp="1"/>
-          </p:cNvSpPr>
-          <p:nvPr>
-            <p:ph type="body" idx="1"/>
-          </p:nvPr>
-        </p:nvSpPr>
-        <p:spPr>
-          <a:noFill/>
-          <a:ln/>
-        </p:spPr>
-        <p:txBody>
-          <a:bodyPr/>
-          <a:lstStyle/>
-          <a:p>
-            <a:pPr eaLnBrk="1" hangingPunct="1"/>
-            <a:endParaRPr lang="en-US" smtClean="0">
-              <a:latin typeface="Times New Roman" pitchFamily="-128" charset="0"/>
-            </a:endParaRPr>
-          </a:p>
-        </p:txBody>
-      </p:sp>
-      <p:sp>
-        <p:nvSpPr>
-          <p:cNvPr id="63492" name="Slide Number Placeholder 3"/>
-          <p:cNvSpPr>
-            <a:spLocks noGrp="1"/>
-          </p:cNvSpPr>
-          <p:nvPr>
-            <p:ph type="sldNum" sz="quarter" idx="5"/>
-          </p:nvPr>
-        </p:nvSpPr>
-        <p:spPr>
-          <a:noFill/>
-        </p:spPr>
-        <p:txBody>
-          <a:bodyPr/>
-          <a:lstStyle/>
-          <a:p>
-            <a:fld id="{58BBC897-2858-4BAA-87E3-124660A724DB}" type="slidenum">
-              <a:rPr lang="en-US" smtClean="0">
-                <a:latin typeface="Times New Roman" pitchFamily="-128" charset="0"/>
-              </a:rPr>
-              <a:pPr/>
-              <a:t>32</a:t>
-            </a:fld>
-            <a:endParaRPr lang="en-US" smtClean="0">
-              <a:latin typeface="Times New Roman" pitchFamily="-128" charset="0"/>
-            </a:endParaRPr>
-          </a:p>
-        </p:txBody>
-      </p:sp>
-      <p:sp>
-        <p:nvSpPr>
-          <p:cNvPr id="63493" name="Footer Placeholder 4"/>
-          <p:cNvSpPr>
-            <a:spLocks noGrp="1"/>
-          </p:cNvSpPr>
-          <p:nvPr>
-            <p:ph type="ftr" sz="quarter" idx="4"/>
-          </p:nvPr>
-        </p:nvSpPr>
-        <p:spPr>
-          <a:noFill/>
-        </p:spPr>
-        <p:txBody>
-          <a:bodyPr/>
-          <a:lstStyle/>
-          <a:p>
-            <a:endParaRPr lang="en-US" smtClean="0">
-              <a:latin typeface="Times New Roman" pitchFamily="-128" charset="0"/>
-            </a:endParaRPr>
-          </a:p>
-        </p:txBody>
-      </p:sp>
-    </p:spTree>
-  </p:cSld>
-  <p:clrMapOvr>
-    <a:masterClrMapping/>
-  </p:clrMapOvr>
-</p:notes>
-</file>
-
 <file path=ppt/notesSlides/notesSlide4.xml><?xml version="1.0" encoding="utf-8"?>
 <p:notes xmlns:a="http://schemas.openxmlformats.org/drawingml/2006/main" xmlns:r="http://schemas.openxmlformats.org/officeDocument/2006/relationships" xmlns:p="http://schemas.openxmlformats.org/presentationml/2006/main">
   <p:cSld>
@@ -6368,54 +6250,6 @@
 </p:sldLayout>
 </file>
 
-<file path=ppt/slideLayouts/slideLayout25.xml><?xml version="1.0" encoding="utf-8"?>
-<p:sldLayout xmlns:a="http://schemas.openxmlformats.org/drawingml/2006/main" xmlns:r="http://schemas.openxmlformats.org/officeDocument/2006/relationships" xmlns:p="http://schemas.openxmlformats.org/presentationml/2006/main" userDrawn="1">
-  <p:cSld name="19_Title and Content">
-    <p:spTree>
-      <p:nvGrpSpPr>
-        <p:cNvPr id="1" name=""/>
-        <p:cNvGrpSpPr/>
-        <p:nvPr/>
-      </p:nvGrpSpPr>
-      <p:grpSpPr>
-        <a:xfrm>
-          <a:off x="0" y="0"/>
-          <a:ext cx="0" cy="0"/>
-          <a:chOff x="0" y="0"/>
-          <a:chExt cx="0" cy="0"/>
-        </a:xfrm>
-      </p:grpSpPr>
-      <p:sp>
-        <p:nvSpPr>
-          <p:cNvPr id="5" name="Title 4"/>
-          <p:cNvSpPr>
-            <a:spLocks noGrp="1"/>
-          </p:cNvSpPr>
-          <p:nvPr>
-            <p:ph type="title"/>
-          </p:nvPr>
-        </p:nvSpPr>
-        <p:spPr/>
-        <p:txBody>
-          <a:bodyPr/>
-          <a:lstStyle/>
-          <a:p>
-            <a:r>
-              <a:rPr lang="en-US" smtClean="0"/>
-              <a:t>Click to edit Master title style</a:t>
-            </a:r>
-            <a:endParaRPr lang="en-US"/>
-          </a:p>
-        </p:txBody>
-      </p:sp>
-    </p:spTree>
-  </p:cSld>
-  <p:clrMapOvr>
-    <a:masterClrMapping/>
-  </p:clrMapOvr>
-</p:sldLayout>
-</file>
-
 <file path=ppt/slideLayouts/slideLayout3.xml><?xml version="1.0" encoding="utf-8"?>
 <p:sldLayout xmlns:a="http://schemas.openxmlformats.org/drawingml/2006/main" xmlns:r="http://schemas.openxmlformats.org/officeDocument/2006/relationships" xmlns:p="http://schemas.openxmlformats.org/presentationml/2006/main" type="titleOnly" preserve="1">
   <p:cSld name="Title Only">
@@ -7609,7 +7443,11 @@
             </a:r>
             <a:r>
               <a:rPr lang="en-US" dirty="0" smtClean="0"/>
-              <a:t> 13W.</a:t>
+              <a:t> </a:t>
+            </a:r>
+            <a:r>
+              <a:rPr lang="en-US" dirty="0" smtClean="0"/>
+              <a:t>11F.</a:t>
             </a:r>
             <a:fld id="{17233D2A-0857-4415-88C1-423492E69A26}" type="slidenum">
               <a:rPr lang="en-US" smtClean="0"/>
@@ -7631,7 +7469,7 @@
           <p:nvPr userDrawn="1"/>
         </p:nvPicPr>
         <p:blipFill>
-          <a:blip r:embed="rId27"/>
+          <a:blip r:embed="rId26"/>
           <a:srcRect/>
           <a:stretch>
             <a:fillRect/>
@@ -7705,7 +7543,22 @@
                 <a:uFillTx/>
                 <a:latin typeface="Comic Sans MS" pitchFamily="66" charset="0"/>
               </a:rPr>
-              <a:t>Albert R Meyer,                 November 30, 2011</a:t>
+              <a:t>Albert R Meyer,                 </a:t>
+            </a:r>
+            <a:r>
+              <a:rPr kumimoji="0" lang="en-US" sz="1200" b="0" i="0" u="none" strike="noStrike" kern="1200" cap="none" spc="0" normalizeH="0" baseline="0" noProof="0" dirty="0" smtClean="0">
+                <a:ln>
+                  <a:noFill/>
+                </a:ln>
+                <a:solidFill>
+                  <a:schemeClr val="tx1"/>
+                </a:solidFill>
+                <a:effectLst/>
+                <a:uLnTx/>
+                <a:uFillTx/>
+                <a:latin typeface="Comic Sans MS" pitchFamily="66" charset="0"/>
+              </a:rPr>
+              <a:t>April 27, 2012</a:t>
             </a:r>
             <a:endParaRPr kumimoji="0" lang="en-US" sz="1200" b="0" i="0" u="none" strike="noStrike" kern="1200" cap="none" spc="0" normalizeH="0" baseline="0" noProof="0" dirty="0">
               <a:ln>
@@ -7731,7 +7584,7 @@
           <p:nvPr userDrawn="1"/>
         </p:nvPicPr>
         <p:blipFill>
-          <a:blip r:embed="rId28"/>
+          <a:blip r:embed="rId27"/>
           <a:stretch>
             <a:fillRect/>
           </a:stretch>
@@ -7774,7 +7627,6 @@
     <p:sldLayoutId id="2147483680" r:id="rId22"/>
     <p:sldLayoutId id="2147483681" r:id="rId23"/>
     <p:sldLayoutId id="2147483682" r:id="rId24"/>
-    <p:sldLayoutId id="2147483683" r:id="rId25"/>
   </p:sldLayoutIdLst>
   <p:hf hdr="0" ftr="0" dt="0"/>
   <p:txStyles>
@@ -15340,7 +15192,7 @@
 </file>
 
 <file path=ppt/slides/slide13.xml><?xml version="1.0" encoding="utf-8"?>
-<p:sld xmlns:a="http://schemas.openxmlformats.org/drawingml/2006/main" xmlns:r="http://schemas.openxmlformats.org/officeDocument/2006/relationships" xmlns:p="http://schemas.openxmlformats.org/presentationml/2006/main" show="0">
+<p:sld xmlns:a="http://schemas.openxmlformats.org/drawingml/2006/main" xmlns:r="http://schemas.openxmlformats.org/officeDocument/2006/relationships" xmlns:p="http://schemas.openxmlformats.org/presentationml/2006/main">
   <p:cSld>
     <p:spTree>
       <p:nvGrpSpPr>
@@ -25146,7 +24998,7 @@
           <a:graphicData uri="http://schemas.openxmlformats.org/presentationml/2006/ole">
             <mc:AlternateContent xmlns:mc="http://schemas.openxmlformats.org/markup-compatibility/2006">
               <mc:Choice xmlns:v="urn:schemas-microsoft-com:vml" Requires="v">
-                <p:oleObj spid="_x0000_s308251" name="Equation" r:id="rId4" imgW="291960" imgH="939600" progId="Equation.DSMT4">
+                <p:oleObj spid="_x0000_s308255" name="Equation" r:id="rId4" imgW="291960" imgH="939600" progId="Equation.DSMT4">
                   <p:embed/>
                 </p:oleObj>
               </mc:Choice>
@@ -25216,7 +25068,7 @@
           <a:graphicData uri="http://schemas.openxmlformats.org/presentationml/2006/ole">
             <mc:AlternateContent xmlns:mc="http://schemas.openxmlformats.org/markup-compatibility/2006">
               <mc:Choice xmlns:v="urn:schemas-microsoft-com:vml" Requires="v">
-                <p:oleObj spid="_x0000_s308252" name="Equation" r:id="rId6" imgW="291960" imgH="939600" progId="Equation.DSMT4">
+                <p:oleObj spid="_x0000_s308256" name="Equation" r:id="rId6" imgW="291960" imgH="939600" progId="Equation.DSMT4">
                   <p:embed/>
                 </p:oleObj>
               </mc:Choice>
@@ -25465,7 +25317,7 @@
             <a:graphicData uri="http://schemas.openxmlformats.org/presentationml/2006/ole">
               <mc:AlternateContent xmlns:mc="http://schemas.openxmlformats.org/markup-compatibility/2006">
                 <mc:Choice xmlns:v="urn:schemas-microsoft-com:vml" Requires="v">
-                  <p:oleObj spid="_x0000_s308253" name="Equation" r:id="rId8" imgW="609480" imgH="939600" progId="Equation.DSMT4">
+                  <p:oleObj spid="_x0000_s308257" name="Equation" r:id="rId8" imgW="609480" imgH="939600" progId="Equation.DSMT4">
                     <p:embed/>
                   </p:oleObj>
                 </mc:Choice>
@@ -26422,7 +26274,7 @@
           <a:graphicData uri="http://schemas.openxmlformats.org/presentationml/2006/ole">
             <mc:AlternateContent xmlns:mc="http://schemas.openxmlformats.org/markup-compatibility/2006">
               <mc:Choice xmlns:v="urn:schemas-microsoft-com:vml" Requires="v">
-                <p:oleObj spid="_x0000_s283664" name="Equation" r:id="rId4" imgW="914400" imgH="406400" progId="Equation.DSMT4">
+                <p:oleObj spid="_x0000_s283666" name="Equation" r:id="rId4" imgW="914400" imgH="406400" progId="Equation.DSMT4">
                   <p:embed/>
                 </p:oleObj>
               </mc:Choice>
@@ -27063,7 +26915,7 @@
           <a:graphicData uri="http://schemas.openxmlformats.org/presentationml/2006/ole">
             <mc:AlternateContent xmlns:mc="http://schemas.openxmlformats.org/markup-compatibility/2006">
               <mc:Choice xmlns:v="urn:schemas-microsoft-com:vml" Requires="v">
-                <p:oleObj spid="_x0000_s332813" name="Equation" r:id="rId4" imgW="1295400" imgH="406400" progId="Equation.DSMT4">
+                <p:oleObj spid="_x0000_s332815" name="Equation" r:id="rId4" imgW="1295400" imgH="406400" progId="Equation.DSMT4">
                   <p:embed/>
                 </p:oleObj>
               </mc:Choice>
@@ -28699,7 +28551,7 @@
           <a:graphicData uri="http://schemas.openxmlformats.org/presentationml/2006/ole">
             <mc:AlternateContent xmlns:mc="http://schemas.openxmlformats.org/markup-compatibility/2006">
               <mc:Choice xmlns:v="urn:schemas-microsoft-com:vml" Requires="v">
-                <p:oleObj spid="_x0000_s247821" name="Equation" r:id="rId4" imgW="1943100" imgH="558800" progId="Equation.DSMT4">
+                <p:oleObj spid="_x0000_s247823" name="Equation" r:id="rId4" imgW="1943100" imgH="558800" progId="Equation.DSMT4">
                   <p:embed/>
                 </p:oleObj>
               </mc:Choice>
@@ -30700,7 +30552,7 @@
           <a:graphicData uri="http://schemas.openxmlformats.org/presentationml/2006/ole">
             <mc:AlternateContent xmlns:mc="http://schemas.openxmlformats.org/markup-compatibility/2006">
               <mc:Choice xmlns:v="urn:schemas-microsoft-com:vml" Requires="v">
-                <p:oleObj spid="_x0000_s297997" name="Equation" r:id="rId8" imgW="2628900" imgH="1219200" progId="Equation.DSMT4">
+                <p:oleObj spid="_x0000_s297999" name="Equation" r:id="rId8" imgW="2628900" imgH="1219200" progId="Equation.DSMT4">
                   <p:embed/>
                 </p:oleObj>
               </mc:Choice>
@@ -30867,7 +30719,7 @@
           <a:graphicData uri="http://schemas.openxmlformats.org/presentationml/2006/ole">
             <mc:AlternateContent xmlns:mc="http://schemas.openxmlformats.org/markup-compatibility/2006">
               <mc:Choice xmlns:v="urn:schemas-microsoft-com:vml" Requires="v">
-                <p:oleObj spid="_x0000_s249869" name="Equation" r:id="rId4" imgW="1002960" imgH="457200" progId="Equation.DSMT4">
+                <p:oleObj spid="_x0000_s249871" name="Equation" r:id="rId4" imgW="1002960" imgH="457200" progId="Equation.DSMT4">
                   <p:embed/>
                 </p:oleObj>
               </mc:Choice>
@@ -31660,7 +31512,7 @@
           <a:graphicData uri="http://schemas.openxmlformats.org/presentationml/2006/ole">
             <mc:AlternateContent xmlns:mc="http://schemas.openxmlformats.org/markup-compatibility/2006">
               <mc:Choice xmlns:v="urn:schemas-microsoft-com:vml" Requires="v">
-                <p:oleObj spid="_x0000_s34839" name="Equation" r:id="rId5" imgW="317500" imgH="533400" progId="Equation.DSMT4">
+                <p:oleObj spid="_x0000_s34843" name="Equation" r:id="rId5" imgW="317500" imgH="533400" progId="Equation.DSMT4">
                   <p:embed/>
                 </p:oleObj>
               </mc:Choice>
@@ -31730,7 +31582,7 @@
           <a:graphicData uri="http://schemas.openxmlformats.org/presentationml/2006/ole">
             <mc:AlternateContent xmlns:mc="http://schemas.openxmlformats.org/markup-compatibility/2006">
               <mc:Choice xmlns:v="urn:schemas-microsoft-com:vml" Requires="v">
-                <p:oleObj spid="_x0000_s34840" name="Equation" r:id="rId7" imgW="787400" imgH="533400" progId="Equation.DSMT4">
+                <p:oleObj spid="_x0000_s34844" name="Equation" r:id="rId7" imgW="787400" imgH="533400" progId="Equation.DSMT4">
                   <p:embed/>
                 </p:oleObj>
               </mc:Choice>
@@ -31792,7 +31644,7 @@
           <a:graphicData uri="http://schemas.openxmlformats.org/presentationml/2006/ole">
             <mc:AlternateContent xmlns:mc="http://schemas.openxmlformats.org/markup-compatibility/2006">
               <mc:Choice xmlns:v="urn:schemas-microsoft-com:vml" Requires="v">
-                <p:oleObj spid="_x0000_s34841" name="Equation" r:id="rId9" imgW="812800" imgH="1168400" progId="Equation.DSMT4">
+                <p:oleObj spid="_x0000_s34845" name="Equation" r:id="rId9" imgW="812800" imgH="1168400" progId="Equation.DSMT4">
                   <p:embed/>
                 </p:oleObj>
               </mc:Choice>
@@ -32122,7 +31974,7 @@
 </file>
 
 <file path=ppt/slides/slide30.xml><?xml version="1.0" encoding="utf-8"?>
-<p:sld xmlns:a="http://schemas.openxmlformats.org/drawingml/2006/main" xmlns:r="http://schemas.openxmlformats.org/officeDocument/2006/relationships" xmlns:p="http://schemas.openxmlformats.org/presentationml/2006/main" show="0">
+<p:sld xmlns:a="http://schemas.openxmlformats.org/drawingml/2006/main" xmlns:r="http://schemas.openxmlformats.org/officeDocument/2006/relationships" xmlns:p="http://schemas.openxmlformats.org/presentationml/2006/main">
   <p:cSld>
     <p:spTree>
       <p:nvGrpSpPr>
@@ -32696,7 +32548,7 @@
           <a:graphicData uri="http://schemas.openxmlformats.org/presentationml/2006/ole">
             <mc:AlternateContent xmlns:mc="http://schemas.openxmlformats.org/markup-compatibility/2006">
               <mc:Choice xmlns:v="urn:schemas-microsoft-com:vml" Requires="v">
-                <p:oleObj spid="_x0000_s250893" name="Equation" r:id="rId12" imgW="1485900" imgH="762000" progId="Equation.DSMT4">
+                <p:oleObj spid="_x0000_s250895" name="Equation" r:id="rId12" imgW="1485900" imgH="762000" progId="Equation.DSMT4">
                   <p:embed/>
                 </p:oleObj>
               </mc:Choice>
@@ -32906,319 +32758,6 @@
 </p:sld>
 </file>
 
-<file path=ppt/slides/slide32.xml><?xml version="1.0" encoding="utf-8"?>
-<p:sld xmlns:a="http://schemas.openxmlformats.org/drawingml/2006/main" xmlns:r="http://schemas.openxmlformats.org/officeDocument/2006/relationships" xmlns:p="http://schemas.openxmlformats.org/presentationml/2006/main">
-  <p:cSld>
-    <p:spTree>
-      <p:nvGrpSpPr>
-        <p:cNvPr id="1" name=""/>
-        <p:cNvGrpSpPr/>
-        <p:nvPr/>
-      </p:nvGrpSpPr>
-      <p:grpSpPr>
-        <a:xfrm>
-          <a:off x="0" y="0"/>
-          <a:ext cx="0" cy="0"/>
-          <a:chOff x="0" y="0"/>
-          <a:chExt cx="0" cy="0"/>
-        </a:xfrm>
-      </p:grpSpPr>
-      <p:sp>
-        <p:nvSpPr>
-          <p:cNvPr id="31746" name="Rectangle 2"/>
-          <p:cNvSpPr>
-            <a:spLocks noGrp="1" noChangeArrowheads="1"/>
-          </p:cNvSpPr>
-          <p:nvPr>
-            <p:ph type="title"/>
-          </p:nvPr>
-        </p:nvSpPr>
-        <p:spPr/>
-        <p:txBody>
-          <a:bodyPr/>
-          <a:lstStyle/>
-          <a:p>
-            <a:pPr eaLnBrk="1" hangingPunct="1"/>
-            <a:r>
-              <a:rPr lang="en-US" sz="3600" smtClean="0">
-                <a:latin typeface="Comic Sans MS" pitchFamily="-128" charset="0"/>
-              </a:rPr>
-              <a:t/>
-            </a:r>
-            <a:br>
-              <a:rPr lang="en-US" sz="3600" smtClean="0">
-                <a:latin typeface="Comic Sans MS" pitchFamily="-128" charset="0"/>
-              </a:rPr>
-            </a:br>
-            <a:endParaRPr lang="en-US" sz="3600" smtClean="0">
-              <a:latin typeface="Comic Sans MS" pitchFamily="-128" charset="0"/>
-            </a:endParaRPr>
-          </a:p>
-        </p:txBody>
-      </p:sp>
-      <p:sp>
-        <p:nvSpPr>
-          <p:cNvPr id="31747" name="Rectangle 3"/>
-          <p:cNvSpPr>
-            <a:spLocks noGrp="1" noChangeArrowheads="1"/>
-          </p:cNvSpPr>
-          <p:nvPr>
-            <p:ph type="body" idx="4294967295"/>
-          </p:nvPr>
-        </p:nvSpPr>
-        <p:spPr bwMode="auto">
-          <a:xfrm>
-            <a:off x="381000" y="1066800"/>
-            <a:ext cx="8305800" cy="4724400"/>
-          </a:xfrm>
-          <a:prstGeom prst="rect">
-            <a:avLst/>
-          </a:prstGeom>
-          <a:noFill/>
-          <a:ln>
-            <a:miter lim="800000"/>
-            <a:headEnd/>
-            <a:tailEnd/>
-          </a:ln>
-        </p:spPr>
-        <p:txBody>
-          <a:bodyPr/>
-          <a:lstStyle/>
-          <a:p>
-            <a:pPr algn="ctr" eaLnBrk="1" hangingPunct="1">
-              <a:buFontTx/>
-              <a:buNone/>
-            </a:pPr>
-            <a:r>
-              <a:rPr lang="en-US" sz="13800" dirty="0" smtClean="0">
-                <a:latin typeface="Comic Sans MS" pitchFamily="-128" charset="0"/>
-              </a:rPr>
-              <a:t>Problems</a:t>
-            </a:r>
-          </a:p>
-          <a:p>
-            <a:pPr algn="ctr" eaLnBrk="1" hangingPunct="1">
-              <a:buFontTx/>
-              <a:buNone/>
-            </a:pPr>
-            <a:r>
-              <a:rPr lang="en-US" sz="13800" dirty="0" smtClean="0">
-                <a:latin typeface="Comic Sans MS" pitchFamily="-128" charset="0"/>
-              </a:rPr>
-              <a:t>1</a:t>
-            </a:r>
-            <a:r>
-              <a:rPr lang="en-US" sz="13800" dirty="0" smtClean="0">
-                <a:latin typeface="Euclid Symbol" charset="2"/>
-                <a:cs typeface="Euclid Symbol" charset="2"/>
-                <a:sym typeface="Euclid Symbol"/>
-              </a:rPr>
-              <a:t>−</a:t>
-            </a:r>
-            <a:r>
-              <a:rPr lang="en-US" sz="13800" dirty="0" smtClean="0">
-                <a:latin typeface="Comic Sans MS" pitchFamily="-128" charset="0"/>
-              </a:rPr>
-              <a:t>4</a:t>
-            </a:r>
-          </a:p>
-        </p:txBody>
-      </p:sp>
-      <p:sp>
-        <p:nvSpPr>
-          <p:cNvPr id="31748" name="Text Box 4"/>
-          <p:cNvSpPr txBox="1">
-            <a:spLocks noChangeArrowheads="1"/>
-          </p:cNvSpPr>
-          <p:nvPr/>
-        </p:nvSpPr>
-        <p:spPr bwMode="auto">
-          <a:xfrm>
-            <a:off x="2057400" y="381000"/>
-            <a:ext cx="4106863" cy="762000"/>
-          </a:xfrm>
-          <a:prstGeom prst="rect">
-            <a:avLst/>
-          </a:prstGeom>
-          <a:noFill/>
-          <a:ln w="9525">
-            <a:noFill/>
-            <a:miter lim="800000"/>
-            <a:headEnd/>
-            <a:tailEnd/>
-          </a:ln>
-        </p:spPr>
-        <p:txBody>
-          <a:bodyPr wrap="none">
-            <a:spAutoFit/>
-          </a:bodyPr>
-          <a:lstStyle/>
-          <a:p>
-            <a:r>
-              <a:rPr lang="en-US">
-                <a:latin typeface="Comic Sans MS" pitchFamily="-128" charset="0"/>
-              </a:rPr>
-              <a:t>Team Problems</a:t>
-            </a:r>
-          </a:p>
-        </p:txBody>
-      </p:sp>
-      <p:sp>
-        <p:nvSpPr>
-          <p:cNvPr id="5" name="Rectangle 11"/>
-          <p:cNvSpPr txBox="1">
-            <a:spLocks noChangeArrowheads="1"/>
-          </p:cNvSpPr>
-          <p:nvPr/>
-        </p:nvSpPr>
-        <p:spPr bwMode="auto">
-          <a:xfrm>
-            <a:off x="6400800" y="6613525"/>
-            <a:ext cx="2667000" cy="244475"/>
-          </a:xfrm>
-          <a:prstGeom prst="rect">
-            <a:avLst/>
-          </a:prstGeom>
-          <a:noFill/>
-          <a:ln w="9525">
-            <a:noFill/>
-            <a:miter lim="800000"/>
-            <a:headEnd/>
-            <a:tailEnd/>
-          </a:ln>
-          <a:effectLst/>
-        </p:spPr>
-        <p:txBody>
-          <a:bodyPr vert="horz" wrap="square" lIns="91440" tIns="45720" rIns="91440" bIns="45720" numCol="1" anchor="t" anchorCtr="0" compatLnSpc="1">
-            <a:prstTxWarp prst="textNoShape">
-              <a:avLst/>
-            </a:prstTxWarp>
-            <a:spAutoFit/>
-          </a:bodyPr>
-          <a:lstStyle>
-            <a:lvl1pPr algn="r">
-              <a:defRPr sz="1000"/>
-            </a:lvl1pPr>
-          </a:lstStyle>
-          <a:p>
-            <a:pPr marL="0" marR="0" lvl="0" indent="0" algn="r" defTabSz="914400" rtl="0" eaLnBrk="1" fontAlgn="base" latinLnBrk="0" hangingPunct="1">
-              <a:lnSpc>
-                <a:spcPct val="100000"/>
-              </a:lnSpc>
-              <a:spcBef>
-                <a:spcPct val="0"/>
-              </a:spcBef>
-              <a:spcAft>
-                <a:spcPct val="0"/>
-              </a:spcAft>
-              <a:buClrTx/>
-              <a:buSzTx/>
-              <a:buFontTx/>
-              <a:buNone/>
-              <a:tabLst/>
-              <a:defRPr/>
-            </a:pPr>
-            <a:r>
-              <a:rPr kumimoji="0" lang="en-US" sz="1000" b="0" i="0" u="none" strike="noStrike" kern="1200" cap="none" spc="0" normalizeH="0" baseline="0" noProof="0" dirty="0" err="1" smtClean="0">
-                <a:ln>
-                  <a:noFill/>
-                </a:ln>
-                <a:solidFill>
-                  <a:schemeClr val="tx1"/>
-                </a:solidFill>
-                <a:effectLst/>
-                <a:uLnTx/>
-                <a:uFillTx/>
-                <a:latin typeface="Comic Sans MS" pitchFamily="66" charset="0"/>
-                <a:ea typeface="+mn-ea"/>
-                <a:cs typeface="+mn-cs"/>
-              </a:rPr>
-              <a:t>lec</a:t>
-            </a:r>
-            <a:r>
-              <a:rPr kumimoji="0" lang="en-US" sz="1000" b="0" i="0" u="none" strike="noStrike" kern="1200" cap="none" spc="0" normalizeH="0" baseline="0" noProof="0" dirty="0" smtClean="0">
-                <a:ln>
-                  <a:noFill/>
-                </a:ln>
-                <a:solidFill>
-                  <a:schemeClr val="tx1"/>
-                </a:solidFill>
-                <a:effectLst/>
-                <a:uLnTx/>
-                <a:uFillTx/>
-                <a:latin typeface="Comic Sans MS" pitchFamily="66" charset="0"/>
-                <a:ea typeface="+mn-ea"/>
-                <a:cs typeface="+mn-cs"/>
-              </a:rPr>
-              <a:t> 13W.</a:t>
-            </a:r>
-            <a:fld id="{17233D2A-0857-4415-88C1-423492E69A26}" type="slidenum">
-              <a:rPr kumimoji="0" lang="en-US" sz="1000" b="0" i="0" u="none" strike="noStrike" kern="1200" cap="none" spc="0" normalizeH="0" baseline="0" noProof="0" smtClean="0">
-                <a:ln>
-                  <a:noFill/>
-                </a:ln>
-                <a:solidFill>
-                  <a:schemeClr val="tx1"/>
-                </a:solidFill>
-                <a:effectLst/>
-                <a:uLnTx/>
-                <a:uFillTx/>
-                <a:latin typeface="Comic Sans MS" pitchFamily="66" charset="0"/>
-                <a:ea typeface="+mn-ea"/>
-                <a:cs typeface="+mn-cs"/>
-              </a:rPr>
-              <a:pPr marL="0" marR="0" lvl="0" indent="0" algn="r" defTabSz="914400" rtl="0" eaLnBrk="1" fontAlgn="base" latinLnBrk="0" hangingPunct="1">
-                <a:lnSpc>
-                  <a:spcPct val="100000"/>
-                </a:lnSpc>
-                <a:spcBef>
-                  <a:spcPct val="0"/>
-                </a:spcBef>
-                <a:spcAft>
-                  <a:spcPct val="0"/>
-                </a:spcAft>
-                <a:buClrTx/>
-                <a:buSzTx/>
-                <a:buFontTx/>
-                <a:buNone/>
-                <a:tabLst/>
-                <a:defRPr/>
-              </a:pPr>
-              <a:t>32</a:t>
-            </a:fld>
-            <a:endParaRPr kumimoji="0" lang="en-US" sz="1000" b="0" i="0" u="none" strike="noStrike" kern="1200" cap="none" spc="0" normalizeH="0" baseline="0" noProof="0" dirty="0">
-              <a:ln>
-                <a:noFill/>
-              </a:ln>
-              <a:solidFill>
-                <a:schemeClr val="tx1"/>
-              </a:solidFill>
-              <a:effectLst/>
-              <a:uLnTx/>
-              <a:uFillTx/>
-              <a:latin typeface="Comic Sans MS" pitchFamily="66" charset="0"/>
-              <a:ea typeface="+mn-ea"/>
-              <a:cs typeface="+mn-cs"/>
-            </a:endParaRPr>
-          </a:p>
-        </p:txBody>
-      </p:sp>
-    </p:spTree>
-  </p:cSld>
-  <p:clrMapOvr>
-    <a:masterClrMapping/>
-  </p:clrMapOvr>
-  <p:transition xmlns:p14="http://schemas.microsoft.com/office/powerpoint/2010/main"/>
-  <p:timing>
-    <p:tnLst>
-      <p:par>
-        <p:cTn xmlns:p14="http://schemas.microsoft.com/office/powerpoint/2010/main" id="1" dur="indefinite" restart="never" nodeType="tmRoot"/>
-      </p:par>
-    </p:tnLst>
-  </p:timing>
-</p:sld>
-</file>
-
 <file path=ppt/slides/slide4.xml><?xml version="1.0" encoding="utf-8"?>
 <p:sld xmlns:a="http://schemas.openxmlformats.org/drawingml/2006/main" xmlns:r="http://schemas.openxmlformats.org/officeDocument/2006/relationships" xmlns:p="http://schemas.openxmlformats.org/presentationml/2006/main">
   <p:cSld>
@@ -33473,7 +33012,7 @@
           <a:graphicData uri="http://schemas.openxmlformats.org/presentationml/2006/ole">
             <mc:AlternateContent xmlns:mc="http://schemas.openxmlformats.org/markup-compatibility/2006">
               <mc:Choice xmlns:v="urn:schemas-microsoft-com:vml" Requires="v">
-                <p:oleObj spid="_x0000_s245773" name="Equation" r:id="rId4" imgW="2412720" imgH="469800" progId="Equation.DSMT4">
+                <p:oleObj spid="_x0000_s245775" name="Equation" r:id="rId4" imgW="2412720" imgH="469800" progId="Equation.DSMT4">
                   <p:embed/>
                 </p:oleObj>
               </mc:Choice>
@@ -34448,7 +33987,7 @@
 </file>
 
 <file path=ppt/slides/slide7.xml><?xml version="1.0" encoding="utf-8"?>
-<p:sld xmlns:a="http://schemas.openxmlformats.org/drawingml/2006/main" xmlns:r="http://schemas.openxmlformats.org/officeDocument/2006/relationships" xmlns:p="http://schemas.openxmlformats.org/presentationml/2006/main" show="0">
+<p:sld xmlns:a="http://schemas.openxmlformats.org/drawingml/2006/main" xmlns:r="http://schemas.openxmlformats.org/officeDocument/2006/relationships" xmlns:p="http://schemas.openxmlformats.org/presentationml/2006/main">
   <p:cSld>
     <p:spTree>
       <p:nvGrpSpPr>

</xml_diff>